<commit_message>
Update presentations for Nebraska.Code().
</commit_message>
<xml_diff>
--- a/Presentations/2025/Introduction to Accessibility.pptx
+++ b/Presentations/2025/Introduction to Accessibility.pptx
@@ -5,18 +5,19 @@
     <p:sldMasterId id="2147483687" r:id="rId4"/>
   </p:sldMasterIdLst>
   <p:notesMasterIdLst>
-    <p:notesMasterId r:id="rId14"/>
+    <p:notesMasterId r:id="rId15"/>
   </p:notesMasterIdLst>
   <p:sldIdLst>
     <p:sldId id="1864" r:id="rId5"/>
     <p:sldId id="1845" r:id="rId6"/>
-    <p:sldId id="1846" r:id="rId7"/>
-    <p:sldId id="1848" r:id="rId8"/>
-    <p:sldId id="1866" r:id="rId9"/>
-    <p:sldId id="1863" r:id="rId10"/>
-    <p:sldId id="1852" r:id="rId11"/>
-    <p:sldId id="1865" r:id="rId12"/>
-    <p:sldId id="1859" r:id="rId13"/>
+    <p:sldId id="1867" r:id="rId7"/>
+    <p:sldId id="1846" r:id="rId8"/>
+    <p:sldId id="1848" r:id="rId9"/>
+    <p:sldId id="1866" r:id="rId10"/>
+    <p:sldId id="1863" r:id="rId11"/>
+    <p:sldId id="1852" r:id="rId12"/>
+    <p:sldId id="1865" r:id="rId13"/>
+    <p:sldId id="1859" r:id="rId14"/>
   </p:sldIdLst>
   <p:sldSz cx="12192000" cy="6858000"/>
   <p:notesSz cx="6858000" cy="9144000"/>
@@ -1155,7 +1156,7 @@
             <a:fld id="{6DEB7EE2-04A2-4FB2-9625-C9C73AC4D32F}" type="slidenum">
               <a:rPr lang="en-US" altLang="en-US" smtClean="0"/>
               <a:pPr/>
-              <a:t>3</a:t>
+              <a:t>4</a:t>
             </a:fld>
             <a:endParaRPr lang="en-US" altLang="en-US" dirty="0"/>
           </a:p>
@@ -1240,7 +1241,7 @@
             <a:fld id="{6DEB7EE2-04A2-4FB2-9625-C9C73AC4D32F}" type="slidenum">
               <a:rPr lang="en-US" altLang="en-US" smtClean="0"/>
               <a:pPr/>
-              <a:t>4</a:t>
+              <a:t>5</a:t>
             </a:fld>
             <a:endParaRPr lang="en-US" altLang="en-US" dirty="0"/>
           </a:p>
@@ -1349,7 +1350,7 @@
             <a:fld id="{6DEB7EE2-04A2-4FB2-9625-C9C73AC4D32F}" type="slidenum">
               <a:rPr lang="en-US" altLang="en-US" smtClean="0"/>
               <a:pPr/>
-              <a:t>5</a:t>
+              <a:t>6</a:t>
             </a:fld>
             <a:endParaRPr lang="en-US" altLang="en-US" dirty="0"/>
           </a:p>
@@ -1538,7 +1539,7 @@
             <a:fld id="{6DEB7EE2-04A2-4FB2-9625-C9C73AC4D32F}" type="slidenum">
               <a:rPr lang="en-US" altLang="en-US" smtClean="0"/>
               <a:pPr/>
-              <a:t>8</a:t>
+              <a:t>9</a:t>
             </a:fld>
             <a:endParaRPr lang="en-US" altLang="en-US" dirty="0"/>
           </a:p>
@@ -1623,7 +1624,7 @@
             <a:fld id="{6DEB7EE2-04A2-4FB2-9625-C9C73AC4D32F}" type="slidenum">
               <a:rPr lang="en-US" altLang="en-US" smtClean="0"/>
               <a:pPr/>
-              <a:t>9</a:t>
+              <a:t>10</a:t>
             </a:fld>
             <a:endParaRPr lang="en-US" altLang="en-US" dirty="0"/>
           </a:p>
@@ -1998,7 +1999,7 @@
           <a:p>
             <a:fld id="{50A1B9BC-7BE7-4893-90FD-CC95830FD8F2}" type="datetimeFigureOut">
               <a:rPr lang="en-US" smtClean="0"/>
-              <a:t>1/15/2025</a:t>
+              <a:t>7/23/25</a:t>
             </a:fld>
             <a:endParaRPr lang="en-US" dirty="0"/>
           </a:p>
@@ -16804,7 +16805,7 @@
             <a:fld id="{1D364696-E1F3-49EF-AEC8-730A16D9A23F}" type="datetimeFigureOut">
               <a:rPr lang="en-US" altLang="en-US" smtClean="0"/>
               <a:pPr/>
-              <a:t>1/15/2025</a:t>
+              <a:t>7/23/25</a:t>
             </a:fld>
             <a:endParaRPr lang="en-US" altLang="en-US" dirty="0"/>
           </a:p>
@@ -17294,6 +17295,167 @@
 </p:sld>
 </file>
 
+<file path=ppt/slides/slide10.xml><?xml version="1.0" encoding="utf-8"?>
+<p:sld xmlns:a="http://schemas.openxmlformats.org/drawingml/2006/main" xmlns:r="http://schemas.openxmlformats.org/officeDocument/2006/relationships" xmlns:p="http://schemas.openxmlformats.org/presentationml/2006/main">
+  <p:cSld>
+    <p:bg>
+      <p:bgPr>
+        <a:solidFill>
+          <a:schemeClr val="bg1"/>
+        </a:solidFill>
+        <a:effectLst/>
+      </p:bgPr>
+    </p:bg>
+    <p:spTree>
+      <p:nvGrpSpPr>
+        <p:cNvPr id="1" name=""/>
+        <p:cNvGrpSpPr/>
+        <p:nvPr/>
+      </p:nvGrpSpPr>
+      <p:grpSpPr>
+        <a:xfrm>
+          <a:off x="0" y="0"/>
+          <a:ext cx="0" cy="0"/>
+          <a:chOff x="0" y="0"/>
+          <a:chExt cx="0" cy="0"/>
+        </a:xfrm>
+      </p:grpSpPr>
+      <p:sp>
+        <p:nvSpPr>
+          <p:cNvPr id="4" name="Title 3">
+            <a:extLst>
+              <a:ext uri="{FF2B5EF4-FFF2-40B4-BE49-F238E27FC236}">
+                <a16:creationId xmlns:a16="http://schemas.microsoft.com/office/drawing/2014/main" id="{068DF32A-D165-40DA-AAE8-A6E9579E2F79}"/>
+              </a:ext>
+            </a:extLst>
+          </p:cNvPr>
+          <p:cNvSpPr>
+            <a:spLocks noGrp="1"/>
+          </p:cNvSpPr>
+          <p:nvPr>
+            <p:ph type="title"/>
+          </p:nvPr>
+        </p:nvSpPr>
+        <p:spPr>
+          <a:xfrm>
+            <a:off x="0" y="665431"/>
+            <a:ext cx="5675599" cy="615553"/>
+          </a:xfrm>
+        </p:spPr>
+        <p:txBody>
+          <a:bodyPr/>
+          <a:lstStyle/>
+          <a:p>
+            <a:r>
+              <a:rPr lang="en-US" dirty="0"/>
+              <a:t>Thank You </a:t>
+            </a:r>
+            <a:r>
+              <a:rPr lang="en-US" dirty="0">
+                <a:solidFill>
+                  <a:schemeClr val="accent5"/>
+                </a:solidFill>
+              </a:rPr>
+              <a:t>&amp;</a:t>
+            </a:r>
+            <a:r>
+              <a:rPr lang="en-US" dirty="0"/>
+              <a:t> QA</a:t>
+            </a:r>
+          </a:p>
+        </p:txBody>
+      </p:sp>
+      <p:pic>
+        <p:nvPicPr>
+          <p:cNvPr id="5" name="Picture 4" descr="QR code to CorgiDev Linktree page.">
+            <a:extLst>
+              <a:ext uri="{FF2B5EF4-FFF2-40B4-BE49-F238E27FC236}">
+                <a16:creationId xmlns:a16="http://schemas.microsoft.com/office/drawing/2014/main" id="{01D67BC9-465F-F953-2870-39DDFD5F17DB}"/>
+              </a:ext>
+            </a:extLst>
+          </p:cNvPr>
+          <p:cNvPicPr>
+            <a:picLocks noChangeAspect="1"/>
+          </p:cNvPicPr>
+          <p:nvPr/>
+        </p:nvPicPr>
+        <p:blipFill>
+          <a:blip r:embed="rId3"/>
+          <a:stretch>
+            <a:fillRect/>
+          </a:stretch>
+        </p:blipFill>
+        <p:spPr>
+          <a:xfrm>
+            <a:off x="7838107" y="1616528"/>
+            <a:ext cx="3624943" cy="3624943"/>
+          </a:xfrm>
+          <a:prstGeom prst="rect">
+            <a:avLst/>
+          </a:prstGeom>
+        </p:spPr>
+      </p:pic>
+      <p:sp>
+        <p:nvSpPr>
+          <p:cNvPr id="8" name="TextBox 7">
+            <a:extLst>
+              <a:ext uri="{FF2B5EF4-FFF2-40B4-BE49-F238E27FC236}">
+                <a16:creationId xmlns:a16="http://schemas.microsoft.com/office/drawing/2014/main" id="{83DB9D43-49AC-6A15-F3F8-26461EF94FAD}"/>
+              </a:ext>
+            </a:extLst>
+          </p:cNvPr>
+          <p:cNvSpPr txBox="1"/>
+          <p:nvPr/>
+        </p:nvSpPr>
+        <p:spPr>
+          <a:xfrm>
+            <a:off x="7838107" y="5404641"/>
+            <a:ext cx="3624943" cy="369332"/>
+          </a:xfrm>
+          <a:prstGeom prst="rect">
+            <a:avLst/>
+          </a:prstGeom>
+          <a:noFill/>
+        </p:spPr>
+        <p:txBody>
+          <a:bodyPr wrap="square">
+            <a:spAutoFit/>
+          </a:bodyPr>
+          <a:lstStyle/>
+          <a:p>
+            <a:pPr algn="ctr"/>
+            <a:r>
+              <a:rPr lang="en-US" altLang="en-US" dirty="0"/>
+              <a:t>https://linktr.ee/corgidev</a:t>
+            </a:r>
+          </a:p>
+        </p:txBody>
+      </p:sp>
+    </p:spTree>
+    <p:extLst>
+      <p:ext uri="{BB962C8B-B14F-4D97-AF65-F5344CB8AC3E}">
+        <p14:creationId xmlns:p14="http://schemas.microsoft.com/office/powerpoint/2010/main" val="576716121"/>
+      </p:ext>
+    </p:extLst>
+  </p:cSld>
+  <p:clrMapOvr>
+    <a:masterClrMapping/>
+  </p:clrMapOvr>
+  <mc:AlternateContent xmlns:mc="http://schemas.openxmlformats.org/markup-compatibility/2006" xmlns:p14="http://schemas.microsoft.com/office/powerpoint/2010/main">
+    <mc:Choice Requires="p14">
+      <p:transition spd="med" p14:dur="700">
+        <p:fade/>
+      </p:transition>
+    </mc:Choice>
+    <mc:Fallback xmlns="">
+      <p:transition spd="med">
+        <p:fade/>
+      </p:transition>
+    </mc:Fallback>
+  </mc:AlternateContent>
+</p:sld>
+</file>
+
 <file path=ppt/slides/slide2.xml><?xml version="1.0" encoding="utf-8"?>
 <p:sld xmlns:a="http://schemas.openxmlformats.org/drawingml/2006/main" xmlns:r="http://schemas.openxmlformats.org/officeDocument/2006/relationships" xmlns:p="http://schemas.openxmlformats.org/presentationml/2006/main">
   <p:cSld>
@@ -17415,6 +17577,187 @@
 </file>
 
 <file path=ppt/slides/slide3.xml><?xml version="1.0" encoding="utf-8"?>
+<p:sld xmlns:a="http://schemas.openxmlformats.org/drawingml/2006/main" xmlns:r="http://schemas.openxmlformats.org/officeDocument/2006/relationships" xmlns:p="http://schemas.openxmlformats.org/presentationml/2006/main">
+  <p:cSld>
+    <p:spTree>
+      <p:nvGrpSpPr>
+        <p:cNvPr id="1" name=""/>
+        <p:cNvGrpSpPr/>
+        <p:nvPr/>
+      </p:nvGrpSpPr>
+      <p:grpSpPr>
+        <a:xfrm>
+          <a:off x="0" y="0"/>
+          <a:ext cx="0" cy="0"/>
+          <a:chOff x="0" y="0"/>
+          <a:chExt cx="0" cy="0"/>
+        </a:xfrm>
+      </p:grpSpPr>
+      <p:sp>
+        <p:nvSpPr>
+          <p:cNvPr id="2" name="Title 1">
+            <a:extLst>
+              <a:ext uri="{FF2B5EF4-FFF2-40B4-BE49-F238E27FC236}">
+                <a16:creationId xmlns:a16="http://schemas.microsoft.com/office/drawing/2014/main" id="{80AFED0B-8F76-413B-4E96-B433C356C22C}"/>
+              </a:ext>
+            </a:extLst>
+          </p:cNvPr>
+          <p:cNvSpPr>
+            <a:spLocks noGrp="1"/>
+          </p:cNvSpPr>
+          <p:nvPr>
+            <p:ph type="title"/>
+          </p:nvPr>
+        </p:nvSpPr>
+        <p:spPr>
+          <a:xfrm>
+            <a:off x="854297" y="810611"/>
+            <a:ext cx="9141397" cy="615553"/>
+          </a:xfrm>
+        </p:spPr>
+        <p:txBody>
+          <a:bodyPr/>
+          <a:lstStyle/>
+          <a:p>
+            <a:pPr algn="l"/>
+            <a:r>
+              <a:rPr lang="en-US" dirty="0"/>
+              <a:t>Agenda</a:t>
+            </a:r>
+          </a:p>
+        </p:txBody>
+      </p:sp>
+      <p:sp>
+        <p:nvSpPr>
+          <p:cNvPr id="3" name="Text Placeholder 2">
+            <a:extLst>
+              <a:ext uri="{FF2B5EF4-FFF2-40B4-BE49-F238E27FC236}">
+                <a16:creationId xmlns:a16="http://schemas.microsoft.com/office/drawing/2014/main" id="{A3AA5763-F7B4-D96B-F5A7-A0AE84E5A250}"/>
+              </a:ext>
+            </a:extLst>
+          </p:cNvPr>
+          <p:cNvSpPr>
+            <a:spLocks noGrp="1"/>
+          </p:cNvSpPr>
+          <p:nvPr>
+            <p:ph type="body" sz="quarter" idx="12"/>
+          </p:nvPr>
+        </p:nvSpPr>
+        <p:spPr>
+          <a:xfrm>
+            <a:off x="854297" y="1689482"/>
+            <a:ext cx="10942751" cy="4357907"/>
+          </a:xfrm>
+        </p:spPr>
+        <p:txBody>
+          <a:bodyPr/>
+          <a:lstStyle/>
+          <a:p>
+            <a:pPr marL="285750" indent="-285750" algn="l">
+              <a:spcBef>
+                <a:spcPts val="1000"/>
+              </a:spcBef>
+              <a:buFont typeface="Arial" panose="020B0604020202020204" pitchFamily="34" charset="0"/>
+              <a:buChar char="•"/>
+            </a:pPr>
+            <a:r>
+              <a:rPr lang="en-US" sz="2400" b="1" dirty="0"/>
+              <a:t>What is Accessibility?</a:t>
+            </a:r>
+          </a:p>
+          <a:p>
+            <a:pPr marL="285750" indent="-285750" algn="l">
+              <a:spcBef>
+                <a:spcPts val="1000"/>
+              </a:spcBef>
+              <a:buFont typeface="Arial" panose="020B0604020202020204" pitchFamily="34" charset="0"/>
+              <a:buChar char="•"/>
+            </a:pPr>
+            <a:r>
+              <a:rPr lang="en-US" sz="2400" b="1" dirty="0"/>
+              <a:t>Accessibility Guidelines</a:t>
+            </a:r>
+          </a:p>
+          <a:p>
+            <a:pPr marL="285750" indent="-285750" algn="l">
+              <a:spcBef>
+                <a:spcPts val="1000"/>
+              </a:spcBef>
+              <a:buFont typeface="Arial" panose="020B0604020202020204" pitchFamily="34" charset="0"/>
+              <a:buChar char="•"/>
+            </a:pPr>
+            <a:r>
+              <a:rPr lang="en-US" sz="2400" b="1" dirty="0"/>
+              <a:t>Accessibility Regulations</a:t>
+            </a:r>
+          </a:p>
+          <a:p>
+            <a:pPr marL="285750" indent="-285750" algn="l">
+              <a:spcBef>
+                <a:spcPts val="1000"/>
+              </a:spcBef>
+              <a:buFont typeface="Arial" panose="020B0604020202020204" pitchFamily="34" charset="0"/>
+              <a:buChar char="•"/>
+            </a:pPr>
+            <a:r>
+              <a:rPr lang="en-US" sz="2400" b="1" dirty="0"/>
+              <a:t>Why care?</a:t>
+            </a:r>
+          </a:p>
+          <a:p>
+            <a:pPr marL="285750" indent="-285750" algn="l">
+              <a:spcBef>
+                <a:spcPts val="1000"/>
+              </a:spcBef>
+              <a:buFont typeface="Arial" panose="020B0604020202020204" pitchFamily="34" charset="0"/>
+              <a:buChar char="•"/>
+            </a:pPr>
+            <a:r>
+              <a:rPr lang="en-US" sz="2400" b="1" dirty="0"/>
+              <a:t>What can you do?</a:t>
+            </a:r>
+          </a:p>
+          <a:p>
+            <a:pPr marL="285750" indent="-285750" algn="l">
+              <a:spcBef>
+                <a:spcPts val="1000"/>
+              </a:spcBef>
+              <a:buFont typeface="Arial" panose="020B0604020202020204" pitchFamily="34" charset="0"/>
+              <a:buChar char="•"/>
+            </a:pPr>
+            <a:r>
+              <a:rPr lang="en-US" sz="2400" b="1" dirty="0"/>
+              <a:t>Tools and Resources</a:t>
+            </a:r>
+          </a:p>
+        </p:txBody>
+      </p:sp>
+    </p:spTree>
+    <p:extLst>
+      <p:ext uri="{BB962C8B-B14F-4D97-AF65-F5344CB8AC3E}">
+        <p14:creationId xmlns:p14="http://schemas.microsoft.com/office/powerpoint/2010/main" val="3657429384"/>
+      </p:ext>
+    </p:extLst>
+  </p:cSld>
+  <p:clrMapOvr>
+    <a:masterClrMapping/>
+  </p:clrMapOvr>
+  <mc:AlternateContent xmlns:mc="http://schemas.openxmlformats.org/markup-compatibility/2006" xmlns:p14="http://schemas.microsoft.com/office/powerpoint/2010/main">
+    <mc:Choice Requires="p14">
+      <p:transition spd="med" p14:dur="700">
+        <p:fade/>
+      </p:transition>
+    </mc:Choice>
+    <mc:Fallback xmlns="">
+      <p:transition spd="med">
+        <p:fade/>
+      </p:transition>
+    </mc:Fallback>
+  </mc:AlternateContent>
+</p:sld>
+</file>
+
+<file path=ppt/slides/slide4.xml><?xml version="1.0" encoding="utf-8"?>
 <p:sld xmlns:a="http://schemas.openxmlformats.org/drawingml/2006/main" xmlns:r="http://schemas.openxmlformats.org/officeDocument/2006/relationships" xmlns:p="http://schemas.openxmlformats.org/presentationml/2006/main">
   <p:cSld>
     <p:bg>
@@ -17823,7 +18166,7 @@
 </p:sld>
 </file>
 
-<file path=ppt/slides/slide4.xml><?xml version="1.0" encoding="utf-8"?>
+<file path=ppt/slides/slide5.xml><?xml version="1.0" encoding="utf-8"?>
 <p:sld xmlns:a="http://schemas.openxmlformats.org/drawingml/2006/main" xmlns:r="http://schemas.openxmlformats.org/officeDocument/2006/relationships" xmlns:p="http://schemas.openxmlformats.org/presentationml/2006/main">
   <p:cSld>
     <p:bg>
@@ -18996,7 +19339,7 @@
 </p:sld>
 </file>
 
-<file path=ppt/slides/slide5.xml><?xml version="1.0" encoding="utf-8"?>
+<file path=ppt/slides/slide6.xml><?xml version="1.0" encoding="utf-8"?>
 <p:sld xmlns:a="http://schemas.openxmlformats.org/drawingml/2006/main" xmlns:r="http://schemas.openxmlformats.org/officeDocument/2006/relationships" xmlns:p="http://schemas.openxmlformats.org/presentationml/2006/main">
   <p:cSld>
     <p:bg>
@@ -19533,13 +19876,13 @@
   <p:clrMapOvr>
     <a:masterClrMapping/>
   </p:clrMapOvr>
-  <mc:AlternateContent xmlns:mc="http://schemas.openxmlformats.org/markup-compatibility/2006">
-    <mc:Choice xmlns:p14="http://schemas.microsoft.com/office/powerpoint/2010/main" Requires="p14">
+  <mc:AlternateContent xmlns:mc="http://schemas.openxmlformats.org/markup-compatibility/2006" xmlns:p14="http://schemas.microsoft.com/office/powerpoint/2010/main">
+    <mc:Choice Requires="p14">
       <p:transition spd="med" p14:dur="700">
         <p:fade/>
       </p:transition>
     </mc:Choice>
-    <mc:Fallback>
+    <mc:Fallback xmlns="">
       <p:transition spd="med">
         <p:fade/>
       </p:transition>
@@ -19548,7 +19891,7 @@
 </p:sld>
 </file>
 
-<file path=ppt/slides/slide6.xml><?xml version="1.0" encoding="utf-8"?>
+<file path=ppt/slides/slide7.xml><?xml version="1.0" encoding="utf-8"?>
 <p:sld xmlns:a="http://schemas.openxmlformats.org/drawingml/2006/main" xmlns:r="http://schemas.openxmlformats.org/officeDocument/2006/relationships" xmlns:p="http://schemas.openxmlformats.org/presentationml/2006/main">
   <p:cSld>
     <p:bg>
@@ -20099,7 +20442,7 @@
 </p:sld>
 </file>
 
-<file path=ppt/slides/slide7.xml><?xml version="1.0" encoding="utf-8"?>
+<file path=ppt/slides/slide8.xml><?xml version="1.0" encoding="utf-8"?>
 <p:sld xmlns:a="http://schemas.openxmlformats.org/drawingml/2006/main" xmlns:r="http://schemas.openxmlformats.org/officeDocument/2006/relationships" xmlns:p="http://schemas.openxmlformats.org/presentationml/2006/main">
   <p:cSld>
     <p:bg>
@@ -20323,7 +20666,7 @@
 </p:sld>
 </file>
 
-<file path=ppt/slides/slide8.xml><?xml version="1.0" encoding="utf-8"?>
+<file path=ppt/slides/slide9.xml><?xml version="1.0" encoding="utf-8"?>
 <p:sld xmlns:a="http://schemas.openxmlformats.org/drawingml/2006/main" xmlns:r="http://schemas.openxmlformats.org/officeDocument/2006/relationships" xmlns:p="http://schemas.openxmlformats.org/presentationml/2006/main">
   <p:cSld>
     <p:bg>
@@ -20686,167 +21029,6 @@
     <p:extLst>
       <p:ext uri="{BB962C8B-B14F-4D97-AF65-F5344CB8AC3E}">
         <p14:creationId xmlns:p14="http://schemas.microsoft.com/office/powerpoint/2010/main" val="2814559039"/>
-      </p:ext>
-    </p:extLst>
-  </p:cSld>
-  <p:clrMapOvr>
-    <a:masterClrMapping/>
-  </p:clrMapOvr>
-  <mc:AlternateContent xmlns:mc="http://schemas.openxmlformats.org/markup-compatibility/2006" xmlns:p14="http://schemas.microsoft.com/office/powerpoint/2010/main">
-    <mc:Choice Requires="p14">
-      <p:transition spd="med" p14:dur="700">
-        <p:fade/>
-      </p:transition>
-    </mc:Choice>
-    <mc:Fallback xmlns="">
-      <p:transition spd="med">
-        <p:fade/>
-      </p:transition>
-    </mc:Fallback>
-  </mc:AlternateContent>
-</p:sld>
-</file>
-
-<file path=ppt/slides/slide9.xml><?xml version="1.0" encoding="utf-8"?>
-<p:sld xmlns:a="http://schemas.openxmlformats.org/drawingml/2006/main" xmlns:r="http://schemas.openxmlformats.org/officeDocument/2006/relationships" xmlns:p="http://schemas.openxmlformats.org/presentationml/2006/main">
-  <p:cSld>
-    <p:bg>
-      <p:bgPr>
-        <a:solidFill>
-          <a:schemeClr val="bg1"/>
-        </a:solidFill>
-        <a:effectLst/>
-      </p:bgPr>
-    </p:bg>
-    <p:spTree>
-      <p:nvGrpSpPr>
-        <p:cNvPr id="1" name=""/>
-        <p:cNvGrpSpPr/>
-        <p:nvPr/>
-      </p:nvGrpSpPr>
-      <p:grpSpPr>
-        <a:xfrm>
-          <a:off x="0" y="0"/>
-          <a:ext cx="0" cy="0"/>
-          <a:chOff x="0" y="0"/>
-          <a:chExt cx="0" cy="0"/>
-        </a:xfrm>
-      </p:grpSpPr>
-      <p:sp>
-        <p:nvSpPr>
-          <p:cNvPr id="4" name="Title 3">
-            <a:extLst>
-              <a:ext uri="{FF2B5EF4-FFF2-40B4-BE49-F238E27FC236}">
-                <a16:creationId xmlns:a16="http://schemas.microsoft.com/office/drawing/2014/main" id="{068DF32A-D165-40DA-AAE8-A6E9579E2F79}"/>
-              </a:ext>
-            </a:extLst>
-          </p:cNvPr>
-          <p:cNvSpPr>
-            <a:spLocks noGrp="1"/>
-          </p:cNvSpPr>
-          <p:nvPr>
-            <p:ph type="title"/>
-          </p:nvPr>
-        </p:nvSpPr>
-        <p:spPr>
-          <a:xfrm>
-            <a:off x="0" y="665431"/>
-            <a:ext cx="5675599" cy="615553"/>
-          </a:xfrm>
-        </p:spPr>
-        <p:txBody>
-          <a:bodyPr/>
-          <a:lstStyle/>
-          <a:p>
-            <a:r>
-              <a:rPr lang="en-US" dirty="0"/>
-              <a:t>Thank You </a:t>
-            </a:r>
-            <a:r>
-              <a:rPr lang="en-US" dirty="0">
-                <a:solidFill>
-                  <a:schemeClr val="accent5"/>
-                </a:solidFill>
-              </a:rPr>
-              <a:t>&amp;</a:t>
-            </a:r>
-            <a:r>
-              <a:rPr lang="en-US" dirty="0"/>
-              <a:t> QA</a:t>
-            </a:r>
-          </a:p>
-        </p:txBody>
-      </p:sp>
-      <p:pic>
-        <p:nvPicPr>
-          <p:cNvPr id="5" name="Picture 4" descr="QR code to CorgiDev Linktree page.">
-            <a:extLst>
-              <a:ext uri="{FF2B5EF4-FFF2-40B4-BE49-F238E27FC236}">
-                <a16:creationId xmlns:a16="http://schemas.microsoft.com/office/drawing/2014/main" id="{01D67BC9-465F-F953-2870-39DDFD5F17DB}"/>
-              </a:ext>
-            </a:extLst>
-          </p:cNvPr>
-          <p:cNvPicPr>
-            <a:picLocks noChangeAspect="1"/>
-          </p:cNvPicPr>
-          <p:nvPr/>
-        </p:nvPicPr>
-        <p:blipFill>
-          <a:blip r:embed="rId3"/>
-          <a:stretch>
-            <a:fillRect/>
-          </a:stretch>
-        </p:blipFill>
-        <p:spPr>
-          <a:xfrm>
-            <a:off x="7838107" y="1616528"/>
-            <a:ext cx="3624943" cy="3624943"/>
-          </a:xfrm>
-          <a:prstGeom prst="rect">
-            <a:avLst/>
-          </a:prstGeom>
-        </p:spPr>
-      </p:pic>
-      <p:sp>
-        <p:nvSpPr>
-          <p:cNvPr id="8" name="TextBox 7">
-            <a:extLst>
-              <a:ext uri="{FF2B5EF4-FFF2-40B4-BE49-F238E27FC236}">
-                <a16:creationId xmlns:a16="http://schemas.microsoft.com/office/drawing/2014/main" id="{83DB9D43-49AC-6A15-F3F8-26461EF94FAD}"/>
-              </a:ext>
-            </a:extLst>
-          </p:cNvPr>
-          <p:cNvSpPr txBox="1"/>
-          <p:nvPr/>
-        </p:nvSpPr>
-        <p:spPr>
-          <a:xfrm>
-            <a:off x="7838107" y="5404641"/>
-            <a:ext cx="3624943" cy="369332"/>
-          </a:xfrm>
-          <a:prstGeom prst="rect">
-            <a:avLst/>
-          </a:prstGeom>
-          <a:noFill/>
-        </p:spPr>
-        <p:txBody>
-          <a:bodyPr wrap="square">
-            <a:spAutoFit/>
-          </a:bodyPr>
-          <a:lstStyle/>
-          <a:p>
-            <a:pPr algn="ctr"/>
-            <a:r>
-              <a:rPr lang="en-US" altLang="en-US" dirty="0"/>
-              <a:t>https://linktr.ee/corgidev</a:t>
-            </a:r>
-          </a:p>
-        </p:txBody>
-      </p:sp>
-    </p:spTree>
-    <p:extLst>
-      <p:ext uri="{BB962C8B-B14F-4D97-AF65-F5344CB8AC3E}">
-        <p14:creationId xmlns:p14="http://schemas.microsoft.com/office/powerpoint/2010/main" val="576716121"/>
       </p:ext>
     </p:extLst>
   </p:cSld>
@@ -21353,12 +21535,12 @@
 </file>
 
 <file path=customXml/item1.xml><?xml version="1.0" encoding="utf-8"?>
-<p:properties xmlns:p="http://schemas.microsoft.com/office/2006/metadata/properties" xmlns:xsi="http://www.w3.org/2001/XMLSchema-instance" xmlns:pc="http://schemas.microsoft.com/office/infopath/2007/PartnerControls">
-  <documentManagement>
-    <Status xmlns="71af3243-3dd4-4a8d-8c0d-dd76da1f02a5">Not started</Status>
-    <MediaServiceKeyPoints xmlns="71af3243-3dd4-4a8d-8c0d-dd76da1f02a5" xsi:nil="true"/>
-  </documentManagement>
-</p:properties>
+<?mso-contentType ?>
+<FormTemplates xmlns="http://schemas.microsoft.com/sharepoint/v3/contenttype/forms">
+  <Display>DocumentLibraryForm</Display>
+  <Edit>DocumentLibraryForm</Edit>
+  <New>DocumentLibraryForm</New>
+</FormTemplates>
 </file>
 
 <file path=customXml/item2.xml><?xml version="1.0" encoding="utf-8"?>
@@ -21583,20 +21765,18 @@
 </file>
 
 <file path=customXml/item3.xml><?xml version="1.0" encoding="utf-8"?>
-<?mso-contentType ?>
-<FormTemplates xmlns="http://schemas.microsoft.com/sharepoint/v3/contenttype/forms">
-  <Display>DocumentLibraryForm</Display>
-  <Edit>DocumentLibraryForm</Edit>
-  <New>DocumentLibraryForm</New>
-</FormTemplates>
+<p:properties xmlns:p="http://schemas.microsoft.com/office/2006/metadata/properties" xmlns:xsi="http://www.w3.org/2001/XMLSchema-instance" xmlns:pc="http://schemas.microsoft.com/office/infopath/2007/PartnerControls">
+  <documentManagement>
+    <Status xmlns="71af3243-3dd4-4a8d-8c0d-dd76da1f02a5">Not started</Status>
+    <MediaServiceKeyPoints xmlns="71af3243-3dd4-4a8d-8c0d-dd76da1f02a5" xsi:nil="true"/>
+  </documentManagement>
+</p:properties>
 </file>
 
 <file path=customXml/itemProps1.xml><?xml version="1.0" encoding="utf-8"?>
-<ds:datastoreItem xmlns:ds="http://schemas.openxmlformats.org/officeDocument/2006/customXml" ds:itemID="{BD4119F0-3CE7-4464-96A2-DC738A807A4F}">
+<ds:datastoreItem xmlns:ds="http://schemas.openxmlformats.org/officeDocument/2006/customXml" ds:itemID="{6D318041-50D7-4E47-9BD9-FE885E42AC67}">
   <ds:schemaRefs>
-    <ds:schemaRef ds:uri="http://schemas.microsoft.com/office/2006/metadata/properties"/>
-    <ds:schemaRef ds:uri="http://schemas.microsoft.com/office/infopath/2007/PartnerControls"/>
-    <ds:schemaRef ds:uri="71af3243-3dd4-4a8d-8c0d-dd76da1f02a5"/>
+    <ds:schemaRef ds:uri="http://schemas.microsoft.com/sharepoint/v3/contenttype/forms"/>
   </ds:schemaRefs>
 </ds:datastoreItem>
 </file>
@@ -21621,9 +21801,11 @@
 </file>
 
 <file path=customXml/itemProps3.xml><?xml version="1.0" encoding="utf-8"?>
-<ds:datastoreItem xmlns:ds="http://schemas.openxmlformats.org/officeDocument/2006/customXml" ds:itemID="{6D318041-50D7-4E47-9BD9-FE885E42AC67}">
+<ds:datastoreItem xmlns:ds="http://schemas.openxmlformats.org/officeDocument/2006/customXml" ds:itemID="{BD4119F0-3CE7-4464-96A2-DC738A807A4F}">
   <ds:schemaRefs>
-    <ds:schemaRef ds:uri="http://schemas.microsoft.com/sharepoint/v3/contenttype/forms"/>
+    <ds:schemaRef ds:uri="http://schemas.microsoft.com/office/2006/metadata/properties"/>
+    <ds:schemaRef ds:uri="http://schemas.microsoft.com/office/infopath/2007/PartnerControls"/>
+    <ds:schemaRef ds:uri="71af3243-3dd4-4a8d-8c0d-dd76da1f02a5"/>
   </ds:schemaRefs>
 </ds:datastoreItem>
 </file>
</xml_diff>

<commit_message>
Update Introduction to Accessibility.pptx
</commit_message>
<xml_diff>
--- a/Presentations/2025/Introduction to Accessibility.pptx
+++ b/Presentations/2025/Introduction to Accessibility.pptx
@@ -1999,7 +1999,7 @@
           <a:p>
             <a:fld id="{50A1B9BC-7BE7-4893-90FD-CC95830FD8F2}" type="datetimeFigureOut">
               <a:rPr lang="en-US" smtClean="0"/>
-              <a:t>7/23/25</a:t>
+              <a:t>7/24/25</a:t>
             </a:fld>
             <a:endParaRPr lang="en-US" dirty="0"/>
           </a:p>
@@ -16805,7 +16805,7 @@
             <a:fld id="{1D364696-E1F3-49EF-AEC8-730A16D9A23F}" type="datetimeFigureOut">
               <a:rPr lang="en-US" altLang="en-US" smtClean="0"/>
               <a:pPr/>
-              <a:t>7/23/25</a:t>
+              <a:t>7/24/25</a:t>
             </a:fld>
             <a:endParaRPr lang="en-US" altLang="en-US" dirty="0"/>
           </a:p>
@@ -17543,11 +17543,8 @@
           <a:p>
             <a:r>
               <a:rPr lang="en-US" dirty="0"/>
-              <a:t>While I will mention regulations, I am not able to provide legal representation/consult.</a:t>
+              <a:t>While I will mention regulations, I am not able to provide legal representation/consultation.</a:t>
             </a:r>
-          </a:p>
-          <a:p>
-            <a:endParaRPr lang="en-US" dirty="0"/>
           </a:p>
         </p:txBody>
       </p:sp>
@@ -17834,13 +17831,13 @@
         </p:nvSpPr>
         <p:spPr>
           <a:xfrm>
-            <a:off x="762000" y="1904999"/>
-            <a:ext cx="2781300" cy="4627685"/>
+            <a:off x="761999" y="1648497"/>
+            <a:ext cx="5334001" cy="4884188"/>
           </a:xfrm>
         </p:spPr>
         <p:txBody>
           <a:bodyPr>
-            <a:normAutofit/>
+            <a:normAutofit lnSpcReduction="10000"/>
           </a:bodyPr>
           <a:lstStyle/>
           <a:p>
@@ -17921,6 +17918,30 @@
                 </a:solidFill>
               </a:rPr>
               <a:t>Area of Impact</a:t>
+            </a:r>
+          </a:p>
+          <a:p>
+            <a:r>
+              <a:rPr lang="en-US" altLang="en-US" dirty="0">
+                <a:solidFill>
+                  <a:schemeClr val="tx1"/>
+                </a:solidFill>
+              </a:rPr>
+              <a:t>Disabled</a:t>
+            </a:r>
+          </a:p>
+          <a:p>
+            <a:pPr marL="342900" indent="-342900">
+              <a:buFont typeface="Arial" panose="020B0604020202020204" pitchFamily="34" charset="0"/>
+              <a:buChar char="•"/>
+            </a:pPr>
+            <a:r>
+              <a:rPr lang="en-US" altLang="en-US" b="0" dirty="0">
+                <a:solidFill>
+                  <a:schemeClr val="tx1"/>
+                </a:solidFill>
+              </a:rPr>
+              <a:t>Permanent / Temporary / Intermittent</a:t>
             </a:r>
           </a:p>
           <a:p>
@@ -21535,12 +21556,12 @@
 </file>
 
 <file path=customXml/item1.xml><?xml version="1.0" encoding="utf-8"?>
-<?mso-contentType ?>
-<FormTemplates xmlns="http://schemas.microsoft.com/sharepoint/v3/contenttype/forms">
-  <Display>DocumentLibraryForm</Display>
-  <Edit>DocumentLibraryForm</Edit>
-  <New>DocumentLibraryForm</New>
-</FormTemplates>
+<p:properties xmlns:p="http://schemas.microsoft.com/office/2006/metadata/properties" xmlns:xsi="http://www.w3.org/2001/XMLSchema-instance" xmlns:pc="http://schemas.microsoft.com/office/infopath/2007/PartnerControls">
+  <documentManagement>
+    <Status xmlns="71af3243-3dd4-4a8d-8c0d-dd76da1f02a5">Not started</Status>
+    <MediaServiceKeyPoints xmlns="71af3243-3dd4-4a8d-8c0d-dd76da1f02a5" xsi:nil="true"/>
+  </documentManagement>
+</p:properties>
 </file>
 
 <file path=customXml/item2.xml><?xml version="1.0" encoding="utf-8"?>
@@ -21765,18 +21786,20 @@
 </file>
 
 <file path=customXml/item3.xml><?xml version="1.0" encoding="utf-8"?>
-<p:properties xmlns:p="http://schemas.microsoft.com/office/2006/metadata/properties" xmlns:xsi="http://www.w3.org/2001/XMLSchema-instance" xmlns:pc="http://schemas.microsoft.com/office/infopath/2007/PartnerControls">
-  <documentManagement>
-    <Status xmlns="71af3243-3dd4-4a8d-8c0d-dd76da1f02a5">Not started</Status>
-    <MediaServiceKeyPoints xmlns="71af3243-3dd4-4a8d-8c0d-dd76da1f02a5" xsi:nil="true"/>
-  </documentManagement>
-</p:properties>
+<?mso-contentType ?>
+<FormTemplates xmlns="http://schemas.microsoft.com/sharepoint/v3/contenttype/forms">
+  <Display>DocumentLibraryForm</Display>
+  <Edit>DocumentLibraryForm</Edit>
+  <New>DocumentLibraryForm</New>
+</FormTemplates>
 </file>
 
 <file path=customXml/itemProps1.xml><?xml version="1.0" encoding="utf-8"?>
-<ds:datastoreItem xmlns:ds="http://schemas.openxmlformats.org/officeDocument/2006/customXml" ds:itemID="{6D318041-50D7-4E47-9BD9-FE885E42AC67}">
+<ds:datastoreItem xmlns:ds="http://schemas.openxmlformats.org/officeDocument/2006/customXml" ds:itemID="{BD4119F0-3CE7-4464-96A2-DC738A807A4F}">
   <ds:schemaRefs>
-    <ds:schemaRef ds:uri="http://schemas.microsoft.com/sharepoint/v3/contenttype/forms"/>
+    <ds:schemaRef ds:uri="http://schemas.microsoft.com/office/2006/metadata/properties"/>
+    <ds:schemaRef ds:uri="http://schemas.microsoft.com/office/infopath/2007/PartnerControls"/>
+    <ds:schemaRef ds:uri="71af3243-3dd4-4a8d-8c0d-dd76da1f02a5"/>
   </ds:schemaRefs>
 </ds:datastoreItem>
 </file>
@@ -21801,11 +21824,9 @@
 </file>
 
 <file path=customXml/itemProps3.xml><?xml version="1.0" encoding="utf-8"?>
-<ds:datastoreItem xmlns:ds="http://schemas.openxmlformats.org/officeDocument/2006/customXml" ds:itemID="{BD4119F0-3CE7-4464-96A2-DC738A807A4F}">
+<ds:datastoreItem xmlns:ds="http://schemas.openxmlformats.org/officeDocument/2006/customXml" ds:itemID="{6D318041-50D7-4E47-9BD9-FE885E42AC67}">
   <ds:schemaRefs>
-    <ds:schemaRef ds:uri="http://schemas.microsoft.com/office/2006/metadata/properties"/>
-    <ds:schemaRef ds:uri="http://schemas.microsoft.com/office/infopath/2007/PartnerControls"/>
-    <ds:schemaRef ds:uri="71af3243-3dd4-4a8d-8c0d-dd76da1f02a5"/>
+    <ds:schemaRef ds:uri="http://schemas.microsoft.com/sharepoint/v3/contenttype/forms"/>
   </ds:schemaRefs>
 </ds:datastoreItem>
 </file>
</xml_diff>